<commit_message>
fixed errors in part numbering
</commit_message>
<xml_diff>
--- a/images/Emission_Path_Explode_Images/Numbered emission explode image.pptx
+++ b/images/Emission_Path_Explode_Images/Numbered emission explode image.pptx
@@ -243,7 +243,7 @@
           <a:p>
             <a:fld id="{DBF739BD-AB43-480C-8E89-E1FB68830F04}" type="datetimeFigureOut">
               <a:rPr lang="en-GB" smtClean="0"/>
-              <a:t>19/12/2018</a:t>
+              <a:t>28/05/2019</a:t>
             </a:fld>
             <a:endParaRPr lang="en-GB"/>
           </a:p>
@@ -413,7 +413,7 @@
           <a:p>
             <a:fld id="{DBF739BD-AB43-480C-8E89-E1FB68830F04}" type="datetimeFigureOut">
               <a:rPr lang="en-GB" smtClean="0"/>
-              <a:t>19/12/2018</a:t>
+              <a:t>28/05/2019</a:t>
             </a:fld>
             <a:endParaRPr lang="en-GB"/>
           </a:p>
@@ -593,7 +593,7 @@
           <a:p>
             <a:fld id="{DBF739BD-AB43-480C-8E89-E1FB68830F04}" type="datetimeFigureOut">
               <a:rPr lang="en-GB" smtClean="0"/>
-              <a:t>19/12/2018</a:t>
+              <a:t>28/05/2019</a:t>
             </a:fld>
             <a:endParaRPr lang="en-GB"/>
           </a:p>
@@ -763,7 +763,7 @@
           <a:p>
             <a:fld id="{DBF739BD-AB43-480C-8E89-E1FB68830F04}" type="datetimeFigureOut">
               <a:rPr lang="en-GB" smtClean="0"/>
-              <a:t>19/12/2018</a:t>
+              <a:t>28/05/2019</a:t>
             </a:fld>
             <a:endParaRPr lang="en-GB"/>
           </a:p>
@@ -1009,7 +1009,7 @@
           <a:p>
             <a:fld id="{DBF739BD-AB43-480C-8E89-E1FB68830F04}" type="datetimeFigureOut">
               <a:rPr lang="en-GB" smtClean="0"/>
-              <a:t>19/12/2018</a:t>
+              <a:t>28/05/2019</a:t>
             </a:fld>
             <a:endParaRPr lang="en-GB"/>
           </a:p>
@@ -1241,7 +1241,7 @@
           <a:p>
             <a:fld id="{DBF739BD-AB43-480C-8E89-E1FB68830F04}" type="datetimeFigureOut">
               <a:rPr lang="en-GB" smtClean="0"/>
-              <a:t>19/12/2018</a:t>
+              <a:t>28/05/2019</a:t>
             </a:fld>
             <a:endParaRPr lang="en-GB"/>
           </a:p>
@@ -1608,7 +1608,7 @@
           <a:p>
             <a:fld id="{DBF739BD-AB43-480C-8E89-E1FB68830F04}" type="datetimeFigureOut">
               <a:rPr lang="en-GB" smtClean="0"/>
-              <a:t>19/12/2018</a:t>
+              <a:t>28/05/2019</a:t>
             </a:fld>
             <a:endParaRPr lang="en-GB"/>
           </a:p>
@@ -1726,7 +1726,7 @@
           <a:p>
             <a:fld id="{DBF739BD-AB43-480C-8E89-E1FB68830F04}" type="datetimeFigureOut">
               <a:rPr lang="en-GB" smtClean="0"/>
-              <a:t>19/12/2018</a:t>
+              <a:t>28/05/2019</a:t>
             </a:fld>
             <a:endParaRPr lang="en-GB"/>
           </a:p>
@@ -1821,7 +1821,7 @@
           <a:p>
             <a:fld id="{DBF739BD-AB43-480C-8E89-E1FB68830F04}" type="datetimeFigureOut">
               <a:rPr lang="en-GB" smtClean="0"/>
-              <a:t>19/12/2018</a:t>
+              <a:t>28/05/2019</a:t>
             </a:fld>
             <a:endParaRPr lang="en-GB"/>
           </a:p>
@@ -2098,7 +2098,7 @@
           <a:p>
             <a:fld id="{DBF739BD-AB43-480C-8E89-E1FB68830F04}" type="datetimeFigureOut">
               <a:rPr lang="en-GB" smtClean="0"/>
-              <a:t>19/12/2018</a:t>
+              <a:t>28/05/2019</a:t>
             </a:fld>
             <a:endParaRPr lang="en-GB"/>
           </a:p>
@@ -2351,7 +2351,7 @@
           <a:p>
             <a:fld id="{DBF739BD-AB43-480C-8E89-E1FB68830F04}" type="datetimeFigureOut">
               <a:rPr lang="en-GB" smtClean="0"/>
-              <a:t>19/12/2018</a:t>
+              <a:t>28/05/2019</a:t>
             </a:fld>
             <a:endParaRPr lang="en-GB"/>
           </a:p>
@@ -2564,7 +2564,7 @@
           <a:p>
             <a:fld id="{DBF739BD-AB43-480C-8E89-E1FB68830F04}" type="datetimeFigureOut">
               <a:rPr lang="en-GB" smtClean="0"/>
-              <a:t>19/12/2018</a:t>
+              <a:t>28/05/2019</a:t>
             </a:fld>
             <a:endParaRPr lang="en-GB"/>
           </a:p>
@@ -2991,7 +2991,7 @@
         </p:blipFill>
         <p:spPr>
           <a:xfrm>
-            <a:off x="1" y="0"/>
+            <a:off x="0" y="0"/>
             <a:ext cx="7314286" cy="3264275"/>
           </a:xfrm>
           <a:prstGeom prst="rect">
@@ -3061,7 +3061,7 @@
                   </a:outerShdw>
                 </a:effectLst>
               </a:rPr>
-              <a:t>11</a:t>
+              <a:t>76</a:t>
             </a:r>
             <a:endParaRPr lang="en-GB" sz="1100" b="1" dirty="0">
               <a:ln w="0"/>
@@ -3141,7 +3141,7 @@
                   </a:outerShdw>
                 </a:effectLst>
               </a:rPr>
-              <a:t>12</a:t>
+              <a:t>77</a:t>
             </a:r>
             <a:endParaRPr lang="en-GB" sz="1100" b="1" dirty="0">
               <a:ln w="0"/>
@@ -3221,7 +3221,7 @@
                   </a:outerShdw>
                 </a:effectLst>
               </a:rPr>
-              <a:t>13</a:t>
+              <a:t>78</a:t>
             </a:r>
             <a:endParaRPr lang="en-GB" sz="1100" b="1" dirty="0">
               <a:ln w="0"/>
@@ -3301,7 +3301,7 @@
                   </a:outerShdw>
                 </a:effectLst>
               </a:rPr>
-              <a:t>14</a:t>
+              <a:t>79</a:t>
             </a:r>
             <a:endParaRPr lang="en-GB" sz="1100" b="1" dirty="0">
               <a:ln w="0"/>
@@ -3381,7 +3381,7 @@
                   </a:outerShdw>
                 </a:effectLst>
               </a:rPr>
-              <a:t>15</a:t>
+              <a:t>80</a:t>
             </a:r>
             <a:endParaRPr lang="en-GB" sz="1100" b="1" dirty="0">
               <a:ln w="0"/>
@@ -3461,7 +3461,7 @@
                   </a:outerShdw>
                 </a:effectLst>
               </a:rPr>
-              <a:t>16</a:t>
+              <a:t>81</a:t>
             </a:r>
             <a:endParaRPr lang="en-GB" sz="1100" b="1" dirty="0">
               <a:ln w="0"/>
@@ -3541,7 +3541,7 @@
                   </a:outerShdw>
                 </a:effectLst>
               </a:rPr>
-              <a:t>17</a:t>
+              <a:t>82</a:t>
             </a:r>
             <a:endParaRPr lang="en-GB" sz="1100" b="1" dirty="0">
               <a:ln w="0"/>
@@ -3621,7 +3621,7 @@
                   </a:outerShdw>
                 </a:effectLst>
               </a:rPr>
-              <a:t>10</a:t>
+              <a:t>75</a:t>
             </a:r>
             <a:endParaRPr lang="en-GB" sz="1100" b="1" dirty="0">
               <a:ln w="0"/>
@@ -3688,7 +3688,7 @@
           <a:p>
             <a:pPr algn="ctr"/>
             <a:r>
-              <a:rPr lang="en-GB" sz="1100" b="1" dirty="0">
+              <a:rPr lang="en-GB" sz="1100" b="1" dirty="0" smtClean="0">
                 <a:ln w="0"/>
                 <a:solidFill>
                   <a:schemeClr val="tx1"/>
@@ -3701,8 +3701,21 @@
                   </a:outerShdw>
                 </a:effectLst>
               </a:rPr>
-              <a:t>9</a:t>
-            </a:r>
+              <a:t>74</a:t>
+            </a:r>
+            <a:endParaRPr lang="en-GB" sz="1100" b="1" dirty="0">
+              <a:ln w="0"/>
+              <a:solidFill>
+                <a:schemeClr val="tx1"/>
+              </a:solidFill>
+              <a:effectLst>
+                <a:outerShdw blurRad="38100" dist="19050" dir="2700000" algn="tl" rotWithShape="0">
+                  <a:schemeClr val="dk1">
+                    <a:alpha val="40000"/>
+                  </a:schemeClr>
+                </a:outerShdw>
+              </a:effectLst>
+            </a:endParaRPr>
           </a:p>
         </p:txBody>
       </p:sp>
@@ -3755,7 +3768,7 @@
           <a:p>
             <a:pPr algn="ctr"/>
             <a:r>
-              <a:rPr lang="en-GB" sz="1100" b="1" dirty="0">
+              <a:rPr lang="en-GB" sz="1100" b="1" dirty="0" smtClean="0">
                 <a:ln w="0"/>
                 <a:solidFill>
                   <a:schemeClr val="tx1"/>
@@ -3768,8 +3781,21 @@
                   </a:outerShdw>
                 </a:effectLst>
               </a:rPr>
-              <a:t>5</a:t>
-            </a:r>
+              <a:t>70</a:t>
+            </a:r>
+            <a:endParaRPr lang="en-GB" sz="1100" b="1" dirty="0">
+              <a:ln w="0"/>
+              <a:solidFill>
+                <a:schemeClr val="tx1"/>
+              </a:solidFill>
+              <a:effectLst>
+                <a:outerShdw blurRad="38100" dist="19050" dir="2700000" algn="tl" rotWithShape="0">
+                  <a:schemeClr val="dk1">
+                    <a:alpha val="40000"/>
+                  </a:schemeClr>
+                </a:outerShdw>
+              </a:effectLst>
+            </a:endParaRPr>
           </a:p>
         </p:txBody>
       </p:sp>
@@ -3822,7 +3848,7 @@
           <a:p>
             <a:pPr algn="ctr"/>
             <a:r>
-              <a:rPr lang="en-GB" sz="1100" b="1" dirty="0">
+              <a:rPr lang="en-GB" sz="1100" b="1" dirty="0" smtClean="0">
                 <a:ln w="0"/>
                 <a:solidFill>
                   <a:schemeClr val="tx1"/>
@@ -3835,7 +3861,7 @@
                   </a:outerShdw>
                 </a:effectLst>
               </a:rPr>
-              <a:t>6</a:t>
+              <a:t>71</a:t>
             </a:r>
           </a:p>
         </p:txBody>
@@ -3889,7 +3915,7 @@
           <a:p>
             <a:pPr algn="ctr"/>
             <a:r>
-              <a:rPr lang="en-GB" sz="1100" b="1" dirty="0">
+              <a:rPr lang="en-GB" sz="1100" b="1" dirty="0" smtClean="0">
                 <a:ln w="0"/>
                 <a:solidFill>
                   <a:schemeClr val="tx1"/>
@@ -3902,8 +3928,21 @@
                   </a:outerShdw>
                 </a:effectLst>
               </a:rPr>
-              <a:t>1</a:t>
-            </a:r>
+              <a:t>66</a:t>
+            </a:r>
+            <a:endParaRPr lang="en-GB" sz="1100" b="1" dirty="0">
+              <a:ln w="0"/>
+              <a:solidFill>
+                <a:schemeClr val="tx1"/>
+              </a:solidFill>
+              <a:effectLst>
+                <a:outerShdw blurRad="38100" dist="19050" dir="2700000" algn="tl" rotWithShape="0">
+                  <a:schemeClr val="dk1">
+                    <a:alpha val="40000"/>
+                  </a:schemeClr>
+                </a:outerShdw>
+              </a:effectLst>
+            </a:endParaRPr>
           </a:p>
         </p:txBody>
       </p:sp>
@@ -3969,7 +4008,7 @@
                   </a:outerShdw>
                 </a:effectLst>
               </a:rPr>
-              <a:t>2</a:t>
+              <a:t>67</a:t>
             </a:r>
             <a:endParaRPr lang="en-GB" sz="1100" b="1" dirty="0">
               <a:ln w="0"/>
@@ -4036,7 +4075,7 @@
           <a:p>
             <a:pPr algn="ctr"/>
             <a:r>
-              <a:rPr lang="en-GB" sz="1100" b="1" dirty="0">
+              <a:rPr lang="en-GB" sz="1100" b="1" dirty="0" smtClean="0">
                 <a:ln w="0"/>
                 <a:solidFill>
                   <a:schemeClr val="tx1"/>
@@ -4049,7 +4088,7 @@
                   </a:outerShdw>
                 </a:effectLst>
               </a:rPr>
-              <a:t>3</a:t>
+              <a:t>68</a:t>
             </a:r>
           </a:p>
         </p:txBody>
@@ -4116,21 +4155,8 @@
                   </a:outerShdw>
                 </a:effectLst>
               </a:rPr>
-              <a:t>4</a:t>
-            </a:r>
-            <a:endParaRPr lang="en-GB" sz="1100" b="1" dirty="0">
-              <a:ln w="0"/>
-              <a:solidFill>
-                <a:schemeClr val="tx1"/>
-              </a:solidFill>
-              <a:effectLst>
-                <a:outerShdw blurRad="38100" dist="19050" dir="2700000" algn="tl" rotWithShape="0">
-                  <a:schemeClr val="dk1">
-                    <a:alpha val="40000"/>
-                  </a:schemeClr>
-                </a:outerShdw>
-              </a:effectLst>
-            </a:endParaRPr>
+              <a:t>69</a:t>
+            </a:r>
           </a:p>
         </p:txBody>
       </p:sp>
@@ -4196,7 +4222,7 @@
                   </a:outerShdw>
                 </a:effectLst>
               </a:rPr>
-              <a:t>22</a:t>
+              <a:t>87</a:t>
             </a:r>
             <a:endParaRPr lang="en-GB" sz="1100" b="1" dirty="0">
               <a:ln w="0"/>
@@ -4276,7 +4302,7 @@
                   </a:outerShdw>
                 </a:effectLst>
               </a:rPr>
-              <a:t>26</a:t>
+              <a:t>91</a:t>
             </a:r>
             <a:endParaRPr lang="en-GB" sz="1100" b="1" dirty="0">
               <a:ln w="0"/>
@@ -4356,7 +4382,7 @@
                   </a:outerShdw>
                 </a:effectLst>
               </a:rPr>
-              <a:t>25</a:t>
+              <a:t>90</a:t>
             </a:r>
             <a:endParaRPr lang="en-GB" sz="1100" b="1" dirty="0">
               <a:ln w="0"/>
@@ -4436,7 +4462,7 @@
                   </a:outerShdw>
                 </a:effectLst>
               </a:rPr>
-              <a:t>24</a:t>
+              <a:t>89</a:t>
             </a:r>
             <a:endParaRPr lang="en-GB" sz="1100" b="1" dirty="0">
               <a:ln w="0"/>
@@ -4516,7 +4542,7 @@
                   </a:outerShdw>
                 </a:effectLst>
               </a:rPr>
-              <a:t>23</a:t>
+              <a:t>88</a:t>
             </a:r>
             <a:endParaRPr lang="en-GB" sz="1100" b="1" dirty="0">
               <a:ln w="0"/>
@@ -4583,7 +4609,7 @@
           <a:p>
             <a:pPr algn="ctr"/>
             <a:r>
-              <a:rPr lang="en-GB" sz="1100" b="1" dirty="0">
+              <a:rPr lang="en-GB" sz="1100" b="1" dirty="0" smtClean="0">
                 <a:ln w="0"/>
                 <a:solidFill>
                   <a:schemeClr val="tx1"/>
@@ -4596,8 +4622,21 @@
                   </a:outerShdw>
                 </a:effectLst>
               </a:rPr>
-              <a:t>8</a:t>
-            </a:r>
+              <a:t>73</a:t>
+            </a:r>
+            <a:endParaRPr lang="en-GB" sz="1100" b="1" dirty="0">
+              <a:ln w="0"/>
+              <a:solidFill>
+                <a:schemeClr val="tx1"/>
+              </a:solidFill>
+              <a:effectLst>
+                <a:outerShdw blurRad="38100" dist="19050" dir="2700000" algn="tl" rotWithShape="0">
+                  <a:schemeClr val="dk1">
+                    <a:alpha val="40000"/>
+                  </a:schemeClr>
+                </a:outerShdw>
+              </a:effectLst>
+            </a:endParaRPr>
           </a:p>
         </p:txBody>
       </p:sp>
@@ -4615,7 +4654,7 @@
         </p:nvSpPr>
         <p:spPr>
           <a:xfrm>
-            <a:off x="4042380" y="1956147"/>
+            <a:off x="3981420" y="1956147"/>
             <a:ext cx="237370" cy="166264"/>
           </a:xfrm>
           <a:prstGeom prst="ellipse">
@@ -4650,7 +4689,7 @@
           <a:p>
             <a:pPr algn="ctr"/>
             <a:r>
-              <a:rPr lang="en-GB" sz="1100" b="1" dirty="0">
+              <a:rPr lang="en-GB" sz="1100" b="1" dirty="0" smtClean="0">
                 <a:ln w="0"/>
                 <a:solidFill>
                   <a:schemeClr val="tx1"/>
@@ -4663,7 +4702,7 @@
                   </a:outerShdw>
                 </a:effectLst>
               </a:rPr>
-              <a:t>7</a:t>
+              <a:t>72</a:t>
             </a:r>
           </a:p>
         </p:txBody>
@@ -4717,7 +4756,7 @@
           <a:p>
             <a:pPr algn="ctr"/>
             <a:r>
-              <a:rPr lang="en-GB" sz="1100" b="1" dirty="0">
+              <a:rPr lang="en-GB" sz="1100" b="1" dirty="0" smtClean="0">
                 <a:ln w="0"/>
                 <a:solidFill>
                   <a:schemeClr val="tx1"/>
@@ -4730,8 +4769,21 @@
                   </a:outerShdw>
                 </a:effectLst>
               </a:rPr>
-              <a:t>f</a:t>
-            </a:r>
+              <a:t>F2</a:t>
+            </a:r>
+            <a:endParaRPr lang="en-GB" sz="1100" b="1" dirty="0">
+              <a:ln w="0"/>
+              <a:solidFill>
+                <a:schemeClr val="tx1"/>
+              </a:solidFill>
+              <a:effectLst>
+                <a:outerShdw blurRad="38100" dist="19050" dir="2700000" algn="tl" rotWithShape="0">
+                  <a:schemeClr val="dk1">
+                    <a:alpha val="40000"/>
+                  </a:schemeClr>
+                </a:outerShdw>
+              </a:effectLst>
+            </a:endParaRPr>
           </a:p>
         </p:txBody>
       </p:sp>
@@ -4784,7 +4836,7 @@
           <a:p>
             <a:pPr algn="ctr"/>
             <a:r>
-              <a:rPr lang="en-GB" sz="1100" b="1" dirty="0">
+              <a:rPr lang="en-GB" sz="1100" b="1" dirty="0" smtClean="0">
                 <a:ln w="0"/>
                 <a:solidFill>
                   <a:schemeClr val="tx1"/>
@@ -4797,8 +4849,21 @@
                   </a:outerShdw>
                 </a:effectLst>
               </a:rPr>
-              <a:t>e</a:t>
-            </a:r>
+              <a:t>L7</a:t>
+            </a:r>
+            <a:endParaRPr lang="en-GB" sz="1100" b="1" dirty="0">
+              <a:ln w="0"/>
+              <a:solidFill>
+                <a:schemeClr val="tx1"/>
+              </a:solidFill>
+              <a:effectLst>
+                <a:outerShdw blurRad="38100" dist="19050" dir="2700000" algn="tl" rotWithShape="0">
+                  <a:schemeClr val="dk1">
+                    <a:alpha val="40000"/>
+                  </a:schemeClr>
+                </a:outerShdw>
+              </a:effectLst>
+            </a:endParaRPr>
           </a:p>
         </p:txBody>
       </p:sp>
@@ -4816,8 +4881,8 @@
         </p:nvSpPr>
         <p:spPr>
           <a:xfrm>
-            <a:off x="3918061" y="1134726"/>
-            <a:ext cx="237370" cy="166264"/>
+            <a:off x="3918060" y="1134726"/>
+            <a:ext cx="402480" cy="183534"/>
           </a:xfrm>
           <a:prstGeom prst="ellipse">
             <a:avLst/>
@@ -4851,7 +4916,7 @@
           <a:p>
             <a:pPr algn="ctr"/>
             <a:r>
-              <a:rPr lang="en-GB" sz="1100" b="1" dirty="0">
+              <a:rPr lang="en-GB" sz="1100" b="1" dirty="0" smtClean="0">
                 <a:ln w="0"/>
                 <a:solidFill>
                   <a:schemeClr val="tx1"/>
@@ -4864,8 +4929,21 @@
                   </a:outerShdw>
                 </a:effectLst>
               </a:rPr>
-              <a:t>b</a:t>
-            </a:r>
+              <a:t>DM2</a:t>
+            </a:r>
+            <a:endParaRPr lang="en-GB" sz="1100" b="1" dirty="0">
+              <a:ln w="0"/>
+              <a:solidFill>
+                <a:schemeClr val="tx1"/>
+              </a:solidFill>
+              <a:effectLst>
+                <a:outerShdw blurRad="38100" dist="19050" dir="2700000" algn="tl" rotWithShape="0">
+                  <a:schemeClr val="dk1">
+                    <a:alpha val="40000"/>
+                  </a:schemeClr>
+                </a:outerShdw>
+              </a:effectLst>
+            </a:endParaRPr>
           </a:p>
         </p:txBody>
       </p:sp>
@@ -4918,7 +4996,7 @@
           <a:p>
             <a:pPr algn="ctr"/>
             <a:r>
-              <a:rPr lang="en-GB" sz="1100" b="1" dirty="0">
+              <a:rPr lang="en-GB" sz="1100" b="1" dirty="0" smtClean="0">
                 <a:ln w="0"/>
                 <a:solidFill>
                   <a:schemeClr val="tx1"/>
@@ -4931,8 +5009,21 @@
                   </a:outerShdw>
                 </a:effectLst>
               </a:rPr>
-              <a:t>c</a:t>
-            </a:r>
+              <a:t>L6</a:t>
+            </a:r>
+            <a:endParaRPr lang="en-GB" sz="1100" b="1" dirty="0">
+              <a:ln w="0"/>
+              <a:solidFill>
+                <a:schemeClr val="tx1"/>
+              </a:solidFill>
+              <a:effectLst>
+                <a:outerShdw blurRad="38100" dist="19050" dir="2700000" algn="tl" rotWithShape="0">
+                  <a:schemeClr val="dk1">
+                    <a:alpha val="40000"/>
+                  </a:schemeClr>
+                </a:outerShdw>
+              </a:effectLst>
+            </a:endParaRPr>
           </a:p>
         </p:txBody>
       </p:sp>
@@ -4985,7 +5076,7 @@
           <a:p>
             <a:pPr algn="ctr"/>
             <a:r>
-              <a:rPr lang="en-GB" sz="1100" b="1" dirty="0">
+              <a:rPr lang="en-GB" sz="1100" b="1" dirty="0" smtClean="0">
                 <a:ln w="0"/>
                 <a:solidFill>
                   <a:schemeClr val="tx1"/>
@@ -4998,8 +5089,21 @@
                   </a:outerShdw>
                 </a:effectLst>
               </a:rPr>
-              <a:t>d</a:t>
-            </a:r>
+              <a:t>F1</a:t>
+            </a:r>
+            <a:endParaRPr lang="en-GB" sz="1100" b="1" dirty="0">
+              <a:ln w="0"/>
+              <a:solidFill>
+                <a:schemeClr val="tx1"/>
+              </a:solidFill>
+              <a:effectLst>
+                <a:outerShdw blurRad="38100" dist="19050" dir="2700000" algn="tl" rotWithShape="0">
+                  <a:schemeClr val="dk1">
+                    <a:alpha val="40000"/>
+                  </a:schemeClr>
+                </a:outerShdw>
+              </a:effectLst>
+            </a:endParaRPr>
           </a:p>
         </p:txBody>
       </p:sp>
@@ -5065,7 +5169,7 @@
                   </a:outerShdw>
                 </a:effectLst>
               </a:rPr>
-              <a:t>33</a:t>
+              <a:t>98</a:t>
             </a:r>
             <a:endParaRPr lang="en-GB" sz="1100" b="1" dirty="0">
               <a:ln w="0"/>
@@ -5145,7 +5249,7 @@
                   </a:outerShdw>
                 </a:effectLst>
               </a:rPr>
-              <a:t>32</a:t>
+              <a:t>97</a:t>
             </a:r>
             <a:endParaRPr lang="en-GB" sz="1100" b="1" dirty="0">
               <a:ln w="0"/>
@@ -5225,7 +5329,7 @@
                   </a:outerShdw>
                 </a:effectLst>
               </a:rPr>
-              <a:t>31</a:t>
+              <a:t>96</a:t>
             </a:r>
             <a:endParaRPr lang="en-GB" sz="1100" b="1" dirty="0">
               <a:ln w="0"/>
@@ -5305,7 +5409,7 @@
                   </a:outerShdw>
                 </a:effectLst>
               </a:rPr>
-              <a:t>30</a:t>
+              <a:t>95</a:t>
             </a:r>
             <a:endParaRPr lang="en-GB" sz="1100" b="1" dirty="0">
               <a:ln w="0"/>
@@ -5385,7 +5489,7 @@
                   </a:outerShdw>
                 </a:effectLst>
               </a:rPr>
-              <a:t>29</a:t>
+              <a:t>94</a:t>
             </a:r>
             <a:endParaRPr lang="en-GB" sz="1100" b="1" dirty="0">
               <a:ln w="0"/>
@@ -5465,7 +5569,7 @@
                   </a:outerShdw>
                 </a:effectLst>
               </a:rPr>
-              <a:t>28</a:t>
+              <a:t>93</a:t>
             </a:r>
             <a:endParaRPr lang="en-GB" sz="1100" b="1" dirty="0">
               <a:ln w="0"/>
@@ -5545,7 +5649,7 @@
                   </a:outerShdw>
                 </a:effectLst>
               </a:rPr>
-              <a:t>27</a:t>
+              <a:t>92</a:t>
             </a:r>
             <a:endParaRPr lang="en-GB" sz="1100" b="1" dirty="0">
               <a:ln w="0"/>
@@ -5625,7 +5729,7 @@
                   </a:outerShdw>
                 </a:effectLst>
               </a:rPr>
-              <a:t>34</a:t>
+              <a:t>99</a:t>
             </a:r>
             <a:endParaRPr lang="en-GB" sz="1100" b="1" dirty="0">
               <a:ln w="0"/>
@@ -5705,7 +5809,7 @@
                   </a:outerShdw>
                 </a:effectLst>
               </a:rPr>
-              <a:t>18</a:t>
+              <a:t>83</a:t>
             </a:r>
             <a:endParaRPr lang="en-GB" sz="1100" b="1" dirty="0">
               <a:ln w="0"/>
@@ -5772,7 +5876,7 @@
           <a:p>
             <a:pPr algn="ctr"/>
             <a:r>
-              <a:rPr lang="en-GB" sz="1100" b="1" dirty="0">
+              <a:rPr lang="en-GB" sz="1100" b="1" dirty="0" smtClean="0">
                 <a:ln w="0"/>
                 <a:solidFill>
                   <a:schemeClr val="tx1"/>
@@ -5785,8 +5889,21 @@
                   </a:outerShdw>
                 </a:effectLst>
               </a:rPr>
-              <a:t>a</a:t>
-            </a:r>
+              <a:t>L5</a:t>
+            </a:r>
+            <a:endParaRPr lang="en-GB" sz="1100" b="1" dirty="0">
+              <a:ln w="0"/>
+              <a:solidFill>
+                <a:schemeClr val="tx1"/>
+              </a:solidFill>
+              <a:effectLst>
+                <a:outerShdw blurRad="38100" dist="19050" dir="2700000" algn="tl" rotWithShape="0">
+                  <a:schemeClr val="dk1">
+                    <a:alpha val="40000"/>
+                  </a:schemeClr>
+                </a:outerShdw>
+              </a:effectLst>
+            </a:endParaRPr>
           </a:p>
         </p:txBody>
       </p:sp>
@@ -5852,7 +5969,7 @@
                   </a:outerShdw>
                 </a:effectLst>
               </a:rPr>
-              <a:t>21</a:t>
+              <a:t>86</a:t>
             </a:r>
             <a:endParaRPr lang="en-GB" sz="1100" b="1" dirty="0">
               <a:ln w="0"/>
@@ -5884,7 +6001,7 @@
         </p:nvSpPr>
         <p:spPr>
           <a:xfrm>
-            <a:off x="3531653" y="1795974"/>
+            <a:off x="3531653" y="1757874"/>
             <a:ext cx="237370" cy="166264"/>
           </a:xfrm>
           <a:prstGeom prst="ellipse">
@@ -5932,7 +6049,7 @@
                   </a:outerShdw>
                 </a:effectLst>
               </a:rPr>
-              <a:t>19</a:t>
+              <a:t>84</a:t>
             </a:r>
             <a:endParaRPr lang="en-GB" sz="1100" b="1" dirty="0">
               <a:ln w="0"/>
@@ -6012,7 +6129,7 @@
                   </a:outerShdw>
                 </a:effectLst>
               </a:rPr>
-              <a:t>20</a:t>
+              <a:t>85</a:t>
             </a:r>
             <a:endParaRPr lang="en-GB" sz="1100" b="1" dirty="0">
               <a:ln w="0"/>

</xml_diff>